<commit_message>
docs: updated Sequence Diagrams for Login and Register Feature
</commit_message>
<xml_diff>
--- a/docs/diagrams/SDforLoginCommand.pptx
+++ b/docs/diagrams/SDforLoginCommand.pptx
@@ -208,7 +208,7 @@
           <a:p>
             <a:fld id="{F5CC4B3F-88C1-4FFA-B1B6-F41C21DC6924}" type="datetimeFigureOut">
               <a:rPr lang="en-US" smtClean="0"/>
-              <a:t>10/14/2018</a:t>
+              <a:t>10/24/2018</a:t>
             </a:fld>
             <a:endParaRPr lang="en-US"/>
           </a:p>
@@ -654,7 +654,7 @@
           <a:p>
             <a:fld id="{78C97017-6FC3-485B-9764-EAC9E56C1D49}" type="datetimeFigureOut">
               <a:rPr lang="en-US" smtClean="0"/>
-              <a:t>10/14/2018</a:t>
+              <a:t>10/24/2018</a:t>
             </a:fld>
             <a:endParaRPr lang="en-US"/>
           </a:p>
@@ -822,7 +822,7 @@
           <a:p>
             <a:fld id="{78C97017-6FC3-485B-9764-EAC9E56C1D49}" type="datetimeFigureOut">
               <a:rPr lang="en-US" smtClean="0"/>
-              <a:t>10/14/2018</a:t>
+              <a:t>10/24/2018</a:t>
             </a:fld>
             <a:endParaRPr lang="en-US"/>
           </a:p>
@@ -1000,7 +1000,7 @@
           <a:p>
             <a:fld id="{78C97017-6FC3-485B-9764-EAC9E56C1D49}" type="datetimeFigureOut">
               <a:rPr lang="en-US" smtClean="0"/>
-              <a:t>10/14/2018</a:t>
+              <a:t>10/24/2018</a:t>
             </a:fld>
             <a:endParaRPr lang="en-US"/>
           </a:p>
@@ -1168,7 +1168,7 @@
           <a:p>
             <a:fld id="{78C97017-6FC3-485B-9764-EAC9E56C1D49}" type="datetimeFigureOut">
               <a:rPr lang="en-US" smtClean="0"/>
-              <a:t>10/14/2018</a:t>
+              <a:t>10/24/2018</a:t>
             </a:fld>
             <a:endParaRPr lang="en-US"/>
           </a:p>
@@ -1413,7 +1413,7 @@
           <a:p>
             <a:fld id="{78C97017-6FC3-485B-9764-EAC9E56C1D49}" type="datetimeFigureOut">
               <a:rPr lang="en-US" smtClean="0"/>
-              <a:t>10/14/2018</a:t>
+              <a:t>10/24/2018</a:t>
             </a:fld>
             <a:endParaRPr lang="en-US"/>
           </a:p>
@@ -1698,7 +1698,7 @@
           <a:p>
             <a:fld id="{78C97017-6FC3-485B-9764-EAC9E56C1D49}" type="datetimeFigureOut">
               <a:rPr lang="en-US" smtClean="0"/>
-              <a:t>10/14/2018</a:t>
+              <a:t>10/24/2018</a:t>
             </a:fld>
             <a:endParaRPr lang="en-US"/>
           </a:p>
@@ -2117,7 +2117,7 @@
           <a:p>
             <a:fld id="{78C97017-6FC3-485B-9764-EAC9E56C1D49}" type="datetimeFigureOut">
               <a:rPr lang="en-US" smtClean="0"/>
-              <a:t>10/14/2018</a:t>
+              <a:t>10/24/2018</a:t>
             </a:fld>
             <a:endParaRPr lang="en-US"/>
           </a:p>
@@ -2234,7 +2234,7 @@
           <a:p>
             <a:fld id="{78C97017-6FC3-485B-9764-EAC9E56C1D49}" type="datetimeFigureOut">
               <a:rPr lang="en-US" smtClean="0"/>
-              <a:t>10/14/2018</a:t>
+              <a:t>10/24/2018</a:t>
             </a:fld>
             <a:endParaRPr lang="en-US"/>
           </a:p>
@@ -2329,7 +2329,7 @@
           <a:p>
             <a:fld id="{78C97017-6FC3-485B-9764-EAC9E56C1D49}" type="datetimeFigureOut">
               <a:rPr lang="en-US" smtClean="0"/>
-              <a:t>10/14/2018</a:t>
+              <a:t>10/24/2018</a:t>
             </a:fld>
             <a:endParaRPr lang="en-US"/>
           </a:p>
@@ -2604,7 +2604,7 @@
           <a:p>
             <a:fld id="{78C97017-6FC3-485B-9764-EAC9E56C1D49}" type="datetimeFigureOut">
               <a:rPr lang="en-US" smtClean="0"/>
-              <a:t>10/14/2018</a:t>
+              <a:t>10/24/2018</a:t>
             </a:fld>
             <a:endParaRPr lang="en-US"/>
           </a:p>
@@ -2856,7 +2856,7 @@
           <a:p>
             <a:fld id="{78C97017-6FC3-485B-9764-EAC9E56C1D49}" type="datetimeFigureOut">
               <a:rPr lang="en-US" smtClean="0"/>
-              <a:t>10/14/2018</a:t>
+              <a:t>10/24/2018</a:t>
             </a:fld>
             <a:endParaRPr lang="en-US"/>
           </a:p>
@@ -3070,7 +3070,7 @@
           <a:p>
             <a:fld id="{78C97017-6FC3-485B-9764-EAC9E56C1D49}" type="datetimeFigureOut">
               <a:rPr lang="en-US" smtClean="0"/>
-              <a:t>10/14/2018</a:t>
+              <a:t>10/24/2018</a:t>
             </a:fld>
             <a:endParaRPr lang="en-US"/>
           </a:p>
@@ -3549,8 +3549,8 @@
         </p:nvSpPr>
         <p:spPr>
           <a:xfrm>
-            <a:off x="2925697" y="2378588"/>
-            <a:ext cx="152400" cy="1806833"/>
+            <a:off x="2925697" y="2378589"/>
+            <a:ext cx="152400" cy="1736212"/>
           </a:xfrm>
           <a:prstGeom prst="rect">
             <a:avLst/>
@@ -3871,13 +3871,16 @@
       <p:cxnSp>
         <p:nvCxnSpPr>
           <p:cNvPr id="17" name="Straight Connector 16"/>
-          <p:cNvCxnSpPr/>
+          <p:cNvCxnSpPr>
+            <a:cxnSpLocks/>
+            <a:stCxn id="16" idx="2"/>
+          </p:cNvCxnSpPr>
           <p:nvPr/>
         </p:nvCxnSpPr>
         <p:spPr>
           <a:xfrm>
-            <a:off x="4802328" y="1904262"/>
-            <a:ext cx="0" cy="2890759"/>
+            <a:off x="4802329" y="2095794"/>
+            <a:ext cx="0" cy="2699227"/>
           </a:xfrm>
           <a:prstGeom prst="line">
             <a:avLst/>
@@ -3914,7 +3917,7 @@
         <p:spPr>
           <a:xfrm>
             <a:off x="4730320" y="2569764"/>
-            <a:ext cx="144016" cy="1688232"/>
+            <a:ext cx="144016" cy="1428017"/>
           </a:xfrm>
           <a:prstGeom prst="rect">
             <a:avLst/>
@@ -4060,8 +4063,8 @@
         </p:nvSpPr>
         <p:spPr>
           <a:xfrm>
-            <a:off x="7130620" y="2636699"/>
-            <a:ext cx="142006" cy="1396322"/>
+            <a:off x="7130620" y="2638726"/>
+            <a:ext cx="144016" cy="405314"/>
           </a:xfrm>
           <a:prstGeom prst="rect">
             <a:avLst/>
@@ -4106,13 +4109,15 @@
       <p:cxnSp>
         <p:nvCxnSpPr>
           <p:cNvPr id="23" name="Straight Arrow Connector 22"/>
-          <p:cNvCxnSpPr/>
+          <p:cNvCxnSpPr>
+            <a:cxnSpLocks/>
+          </p:cNvCxnSpPr>
           <p:nvPr/>
         </p:nvCxnSpPr>
         <p:spPr>
           <a:xfrm>
-            <a:off x="1805846" y="2463400"/>
-            <a:ext cx="1119851" cy="0"/>
+            <a:off x="1643804" y="2381252"/>
+            <a:ext cx="1284303" cy="0"/>
           </a:xfrm>
           <a:prstGeom prst="straightConnector1">
             <a:avLst/>
@@ -4147,8 +4152,8 @@
         </p:nvSpPr>
         <p:spPr>
           <a:xfrm>
-            <a:off x="1720028" y="2483301"/>
-            <a:ext cx="1191859" cy="553998"/>
+            <a:off x="1737483" y="2468255"/>
+            <a:ext cx="1237221" cy="738664"/>
           </a:xfrm>
           <a:prstGeom prst="rect">
             <a:avLst/>
@@ -4170,13 +4175,23 @@
             </a:br>
             <a:r>
               <a:rPr lang="en-US" sz="1200" dirty="0"/>
-              <a:t>user/demo</a:t>
+              <a:t>user/test</a:t>
             </a:r>
           </a:p>
           <a:p>
             <a:r>
               <a:rPr lang="en-US" sz="1200" dirty="0"/>
               <a:t>pass/#Test123</a:t>
+            </a:r>
+          </a:p>
+          <a:p>
+            <a:r>
+              <a:rPr lang="en-US" sz="1200" dirty="0" err="1"/>
+              <a:t>userdata</a:t>
+            </a:r>
+            <a:r>
+              <a:rPr lang="en-US" sz="1200" dirty="0"/>
+              <a:t>/test.xml</a:t>
             </a:r>
           </a:p>
         </p:txBody>
@@ -4258,7 +4273,7 @@
         </p:nvCxnSpPr>
         <p:spPr>
           <a:xfrm>
-            <a:off x="4818500" y="2661421"/>
+            <a:off x="4818500" y="2642369"/>
             <a:ext cx="2309640" cy="0"/>
           </a:xfrm>
           <a:prstGeom prst="straightConnector1">
@@ -4352,7 +4367,7 @@
         </p:nvCxnSpPr>
         <p:spPr>
           <a:xfrm>
-            <a:off x="4874328" y="3891982"/>
+            <a:off x="4874328" y="3885632"/>
             <a:ext cx="2309640" cy="0"/>
           </a:xfrm>
           <a:prstGeom prst="straightConnector1">
@@ -4385,13 +4400,15 @@
       <p:cxnSp>
         <p:nvCxnSpPr>
           <p:cNvPr id="35" name="Straight Arrow Connector 34"/>
-          <p:cNvCxnSpPr/>
+          <p:cNvCxnSpPr>
+            <a:cxnSpLocks/>
+          </p:cNvCxnSpPr>
           <p:nvPr/>
         </p:nvCxnSpPr>
         <p:spPr>
           <a:xfrm>
-            <a:off x="3054713" y="3997783"/>
-            <a:ext cx="1637115" cy="0"/>
+            <a:off x="3076378" y="3991433"/>
+            <a:ext cx="1629868" cy="0"/>
           </a:xfrm>
           <a:prstGeom prst="straightConnector1">
             <a:avLst/>
@@ -4428,8 +4445,8 @@
         </p:nvCxnSpPr>
         <p:spPr>
           <a:xfrm>
-            <a:off x="1729646" y="4104463"/>
-            <a:ext cx="1196051" cy="0"/>
+            <a:off x="1653801" y="4108450"/>
+            <a:ext cx="1347741" cy="0"/>
           </a:xfrm>
           <a:prstGeom prst="straightConnector1">
             <a:avLst/>
@@ -4506,13 +4523,15 @@
               </a:ext>
             </a:extLst>
           </p:cNvPr>
-          <p:cNvCxnSpPr/>
+          <p:cNvCxnSpPr>
+            <a:cxnSpLocks/>
+          </p:cNvCxnSpPr>
           <p:nvPr/>
         </p:nvCxnSpPr>
         <p:spPr>
           <a:xfrm>
-            <a:off x="4821368" y="3517377"/>
-            <a:ext cx="2309640" cy="0"/>
+            <a:off x="4809834" y="3517377"/>
+            <a:ext cx="2329840" cy="0"/>
           </a:xfrm>
           <a:prstGeom prst="straightConnector1">
             <a:avLst/>
@@ -4688,6 +4707,63 @@
             <a:endParaRPr lang="en-US" sz="1200" i="1" dirty="0">
               <a:solidFill>
                 <a:srgbClr val="7030A0"/>
+              </a:solidFill>
+            </a:endParaRPr>
+          </a:p>
+        </p:txBody>
+      </p:sp>
+      <p:sp>
+        <p:nvSpPr>
+          <p:cNvPr id="30" name="Rectangle 29">
+            <a:extLst>
+              <a:ext uri="{FF2B5EF4-FFF2-40B4-BE49-F238E27FC236}">
+                <a16:creationId xmlns:a16="http://schemas.microsoft.com/office/drawing/2014/main" id="{589B9814-E61F-45D8-97EB-BFAD4DCA22F4}"/>
+              </a:ext>
+            </a:extLst>
+          </p:cNvPr>
+          <p:cNvSpPr/>
+          <p:nvPr/>
+        </p:nvSpPr>
+        <p:spPr>
+          <a:xfrm>
+            <a:off x="7144196" y="3517377"/>
+            <a:ext cx="144013" cy="375528"/>
+          </a:xfrm>
+          <a:prstGeom prst="rect">
+            <a:avLst/>
+          </a:prstGeom>
+          <a:solidFill>
+            <a:srgbClr val="7030A0"/>
+          </a:solidFill>
+          <a:ln>
+            <a:solidFill>
+              <a:srgbClr val="7030A0"/>
+            </a:solidFill>
+          </a:ln>
+          <a:effectLst/>
+        </p:spPr>
+        <p:style>
+          <a:lnRef idx="1">
+            <a:schemeClr val="accent3"/>
+          </a:lnRef>
+          <a:fillRef idx="2">
+            <a:schemeClr val="accent3"/>
+          </a:fillRef>
+          <a:effectRef idx="1">
+            <a:schemeClr val="accent3"/>
+          </a:effectRef>
+          <a:fontRef idx="minor">
+            <a:schemeClr val="dk1"/>
+          </a:fontRef>
+        </p:style>
+        <p:txBody>
+          <a:bodyPr rtlCol="0" anchor="ctr"/>
+          <a:lstStyle/>
+          <a:p>
+            <a:pPr algn="ctr"/>
+            <a:endParaRPr lang="en-SG" sz="1400">
+              <a:solidFill>
+                <a:schemeClr val="dk1"/>
               </a:solidFill>
             </a:endParaRPr>
           </a:p>

</xml_diff>

<commit_message>
diagrams: resolved discrepancies in Sequence Diagram for LoginCommand
</commit_message>
<xml_diff>
--- a/docs/diagrams/SDforLoginCommand.pptx
+++ b/docs/diagrams/SDforLoginCommand.pptx
@@ -208,7 +208,7 @@
           <a:p>
             <a:fld id="{F5CC4B3F-88C1-4FFA-B1B6-F41C21DC6924}" type="datetimeFigureOut">
               <a:rPr lang="en-US" smtClean="0"/>
-              <a:t>10/24/2018</a:t>
+              <a:t>11/11/2018</a:t>
             </a:fld>
             <a:endParaRPr lang="en-US"/>
           </a:p>
@@ -475,6 +475,90 @@
 </p:notesMaster>
 </file>
 
+<file path=ppt/notesSlides/notesSlide1.xml><?xml version="1.0" encoding="utf-8"?>
+<p:notes xmlns:a="http://schemas.openxmlformats.org/drawingml/2006/main" xmlns:r="http://schemas.openxmlformats.org/officeDocument/2006/relationships" xmlns:p="http://schemas.openxmlformats.org/presentationml/2006/main">
+  <p:cSld>
+    <p:spTree>
+      <p:nvGrpSpPr>
+        <p:cNvPr id="1" name=""/>
+        <p:cNvGrpSpPr/>
+        <p:nvPr/>
+      </p:nvGrpSpPr>
+      <p:grpSpPr>
+        <a:xfrm>
+          <a:off x="0" y="0"/>
+          <a:ext cx="0" cy="0"/>
+          <a:chOff x="0" y="0"/>
+          <a:chExt cx="0" cy="0"/>
+        </a:xfrm>
+      </p:grpSpPr>
+      <p:sp>
+        <p:nvSpPr>
+          <p:cNvPr id="2" name="Slide Image Placeholder 1"/>
+          <p:cNvSpPr>
+            <a:spLocks noGrp="1" noRot="1" noChangeAspect="1"/>
+          </p:cNvSpPr>
+          <p:nvPr>
+            <p:ph type="sldImg"/>
+          </p:nvPr>
+        </p:nvSpPr>
+        <p:spPr/>
+      </p:sp>
+      <p:sp>
+        <p:nvSpPr>
+          <p:cNvPr id="3" name="Notes Placeholder 2"/>
+          <p:cNvSpPr>
+            <a:spLocks noGrp="1"/>
+          </p:cNvSpPr>
+          <p:nvPr>
+            <p:ph type="body" idx="1"/>
+          </p:nvPr>
+        </p:nvSpPr>
+        <p:spPr/>
+        <p:txBody>
+          <a:bodyPr/>
+          <a:lstStyle/>
+          <a:p>
+            <a:endParaRPr lang="en-SG" dirty="0"/>
+          </a:p>
+        </p:txBody>
+      </p:sp>
+      <p:sp>
+        <p:nvSpPr>
+          <p:cNvPr id="4" name="Slide Number Placeholder 3"/>
+          <p:cNvSpPr>
+            <a:spLocks noGrp="1"/>
+          </p:cNvSpPr>
+          <p:nvPr>
+            <p:ph type="sldNum" sz="quarter" idx="5"/>
+          </p:nvPr>
+        </p:nvSpPr>
+        <p:spPr/>
+        <p:txBody>
+          <a:bodyPr/>
+          <a:lstStyle/>
+          <a:p>
+            <a:fld id="{5A7AB025-77E3-4BD1-A2FD-B3183DBA47A3}" type="slidenum">
+              <a:rPr lang="en-US" smtClean="0"/>
+              <a:t>1</a:t>
+            </a:fld>
+            <a:endParaRPr lang="en-US"/>
+          </a:p>
+        </p:txBody>
+      </p:sp>
+    </p:spTree>
+    <p:extLst>
+      <p:ext uri="{BB962C8B-B14F-4D97-AF65-F5344CB8AC3E}">
+        <p14:creationId xmlns:p14="http://schemas.microsoft.com/office/powerpoint/2010/main" val="3986100022"/>
+      </p:ext>
+    </p:extLst>
+  </p:cSld>
+  <p:clrMapOvr>
+    <a:masterClrMapping/>
+  </p:clrMapOvr>
+</p:notes>
+</file>
+
 <file path=ppt/slideLayouts/slideLayout1.xml><?xml version="1.0" encoding="utf-8"?>
 <p:sldLayout xmlns:a="http://schemas.openxmlformats.org/drawingml/2006/main" xmlns:r="http://schemas.openxmlformats.org/officeDocument/2006/relationships" xmlns:p="http://schemas.openxmlformats.org/presentationml/2006/main" type="title" preserve="1">
   <p:cSld name="Title Slide">
@@ -654,7 +738,7 @@
           <a:p>
             <a:fld id="{78C97017-6FC3-485B-9764-EAC9E56C1D49}" type="datetimeFigureOut">
               <a:rPr lang="en-US" smtClean="0"/>
-              <a:t>10/24/2018</a:t>
+              <a:t>11/11/2018</a:t>
             </a:fld>
             <a:endParaRPr lang="en-US"/>
           </a:p>
@@ -822,7 +906,7 @@
           <a:p>
             <a:fld id="{78C97017-6FC3-485B-9764-EAC9E56C1D49}" type="datetimeFigureOut">
               <a:rPr lang="en-US" smtClean="0"/>
-              <a:t>10/24/2018</a:t>
+              <a:t>11/11/2018</a:t>
             </a:fld>
             <a:endParaRPr lang="en-US"/>
           </a:p>
@@ -1000,7 +1084,7 @@
           <a:p>
             <a:fld id="{78C97017-6FC3-485B-9764-EAC9E56C1D49}" type="datetimeFigureOut">
               <a:rPr lang="en-US" smtClean="0"/>
-              <a:t>10/24/2018</a:t>
+              <a:t>11/11/2018</a:t>
             </a:fld>
             <a:endParaRPr lang="en-US"/>
           </a:p>
@@ -1168,7 +1252,7 @@
           <a:p>
             <a:fld id="{78C97017-6FC3-485B-9764-EAC9E56C1D49}" type="datetimeFigureOut">
               <a:rPr lang="en-US" smtClean="0"/>
-              <a:t>10/24/2018</a:t>
+              <a:t>11/11/2018</a:t>
             </a:fld>
             <a:endParaRPr lang="en-US"/>
           </a:p>
@@ -1413,7 +1497,7 @@
           <a:p>
             <a:fld id="{78C97017-6FC3-485B-9764-EAC9E56C1D49}" type="datetimeFigureOut">
               <a:rPr lang="en-US" smtClean="0"/>
-              <a:t>10/24/2018</a:t>
+              <a:t>11/11/2018</a:t>
             </a:fld>
             <a:endParaRPr lang="en-US"/>
           </a:p>
@@ -1698,7 +1782,7 @@
           <a:p>
             <a:fld id="{78C97017-6FC3-485B-9764-EAC9E56C1D49}" type="datetimeFigureOut">
               <a:rPr lang="en-US" smtClean="0"/>
-              <a:t>10/24/2018</a:t>
+              <a:t>11/11/2018</a:t>
             </a:fld>
             <a:endParaRPr lang="en-US"/>
           </a:p>
@@ -2117,7 +2201,7 @@
           <a:p>
             <a:fld id="{78C97017-6FC3-485B-9764-EAC9E56C1D49}" type="datetimeFigureOut">
               <a:rPr lang="en-US" smtClean="0"/>
-              <a:t>10/24/2018</a:t>
+              <a:t>11/11/2018</a:t>
             </a:fld>
             <a:endParaRPr lang="en-US"/>
           </a:p>
@@ -2234,7 +2318,7 @@
           <a:p>
             <a:fld id="{78C97017-6FC3-485B-9764-EAC9E56C1D49}" type="datetimeFigureOut">
               <a:rPr lang="en-US" smtClean="0"/>
-              <a:t>10/24/2018</a:t>
+              <a:t>11/11/2018</a:t>
             </a:fld>
             <a:endParaRPr lang="en-US"/>
           </a:p>
@@ -2329,7 +2413,7 @@
           <a:p>
             <a:fld id="{78C97017-6FC3-485B-9764-EAC9E56C1D49}" type="datetimeFigureOut">
               <a:rPr lang="en-US" smtClean="0"/>
-              <a:t>10/24/2018</a:t>
+              <a:t>11/11/2018</a:t>
             </a:fld>
             <a:endParaRPr lang="en-US"/>
           </a:p>
@@ -2604,7 +2688,7 @@
           <a:p>
             <a:fld id="{78C97017-6FC3-485B-9764-EAC9E56C1D49}" type="datetimeFigureOut">
               <a:rPr lang="en-US" smtClean="0"/>
-              <a:t>10/24/2018</a:t>
+              <a:t>11/11/2018</a:t>
             </a:fld>
             <a:endParaRPr lang="en-US"/>
           </a:p>
@@ -2856,7 +2940,7 @@
           <a:p>
             <a:fld id="{78C97017-6FC3-485B-9764-EAC9E56C1D49}" type="datetimeFigureOut">
               <a:rPr lang="en-US" smtClean="0"/>
-              <a:t>10/24/2018</a:t>
+              <a:t>11/11/2018</a:t>
             </a:fld>
             <a:endParaRPr lang="en-US"/>
           </a:p>
@@ -3070,7 +3154,7 @@
           <a:p>
             <a:fld id="{78C97017-6FC3-485B-9764-EAC9E56C1D49}" type="datetimeFigureOut">
               <a:rPr lang="en-US" smtClean="0"/>
-              <a:t>10/24/2018</a:t>
+              <a:t>11/11/2018</a:t>
             </a:fld>
             <a:endParaRPr lang="en-US"/>
           </a:p>
@@ -4064,7 +4148,7 @@
         <p:spPr>
           <a:xfrm>
             <a:off x="7130620" y="2638726"/>
-            <a:ext cx="144016" cy="405314"/>
+            <a:ext cx="144016" cy="256873"/>
           </a:xfrm>
           <a:prstGeom prst="rect">
             <a:avLst/>
@@ -4309,7 +4393,7 @@
         </p:nvSpPr>
         <p:spPr>
           <a:xfrm>
-            <a:off x="4997200" y="2680004"/>
+            <a:off x="5042333" y="2410612"/>
             <a:ext cx="2035606" cy="184666"/>
           </a:xfrm>
           <a:prstGeom prst="rect">
@@ -4359,44 +4443,6 @@
           </a:p>
         </p:txBody>
       </p:sp>
-      <p:cxnSp>
-        <p:nvCxnSpPr>
-          <p:cNvPr id="34" name="Straight Arrow Connector 33"/>
-          <p:cNvCxnSpPr/>
-          <p:nvPr/>
-        </p:nvCxnSpPr>
-        <p:spPr>
-          <a:xfrm>
-            <a:off x="4874328" y="3885632"/>
-            <a:ext cx="2309640" cy="0"/>
-          </a:xfrm>
-          <a:prstGeom prst="straightConnector1">
-            <a:avLst/>
-          </a:prstGeom>
-          <a:ln w="19050">
-            <a:solidFill>
-              <a:srgbClr val="7030A0"/>
-            </a:solidFill>
-            <a:prstDash val="sysDash"/>
-            <a:headEnd type="arrow" w="med" len="med"/>
-            <a:tailEnd type="none" w="med" len="med"/>
-          </a:ln>
-        </p:spPr>
-        <p:style>
-          <a:lnRef idx="1">
-            <a:schemeClr val="accent1"/>
-          </a:lnRef>
-          <a:fillRef idx="0">
-            <a:schemeClr val="accent1"/>
-          </a:fillRef>
-          <a:effectRef idx="0">
-            <a:schemeClr val="accent1"/>
-          </a:effectRef>
-          <a:fontRef idx="minor">
-            <a:schemeClr val="tx1"/>
-          </a:fontRef>
-        </p:style>
-      </p:cxnSp>
       <p:cxnSp>
         <p:nvCxnSpPr>
           <p:cNvPr id="35" name="Straight Arrow Connector 34"/>
@@ -4530,7 +4576,7 @@
         </p:nvCxnSpPr>
         <p:spPr>
           <a:xfrm>
-            <a:off x="4809834" y="3517377"/>
+            <a:off x="4805071" y="3605215"/>
             <a:ext cx="2329840" cy="0"/>
           </a:xfrm>
           <a:prstGeom prst="straightConnector1">
@@ -4572,7 +4618,7 @@
         </p:nvSpPr>
         <p:spPr>
           <a:xfrm>
-            <a:off x="4996628" y="3543555"/>
+            <a:off x="4996628" y="3637712"/>
             <a:ext cx="2035606" cy="184666"/>
           </a:xfrm>
           <a:prstGeom prst="rect">
@@ -4619,96 +4665,6 @@
               </a:rPr>
               <a:t>)</a:t>
             </a:r>
-          </a:p>
-        </p:txBody>
-      </p:sp>
-      <p:cxnSp>
-        <p:nvCxnSpPr>
-          <p:cNvPr id="59" name="Straight Arrow Connector 58">
-            <a:extLst>
-              <a:ext uri="{FF2B5EF4-FFF2-40B4-BE49-F238E27FC236}">
-                <a16:creationId xmlns:a16="http://schemas.microsoft.com/office/drawing/2014/main" id="{4248A99B-A74A-4CFA-BE91-E739586E04EF}"/>
-              </a:ext>
-            </a:extLst>
-          </p:cNvPr>
-          <p:cNvCxnSpPr/>
-          <p:nvPr/>
-        </p:nvCxnSpPr>
-        <p:spPr>
-          <a:xfrm>
-            <a:off x="4871768" y="3037299"/>
-            <a:ext cx="2309640" cy="0"/>
-          </a:xfrm>
-          <a:prstGeom prst="straightConnector1">
-            <a:avLst/>
-          </a:prstGeom>
-          <a:ln w="19050">
-            <a:solidFill>
-              <a:srgbClr val="7030A0"/>
-            </a:solidFill>
-            <a:prstDash val="sysDash"/>
-            <a:headEnd type="arrow" w="med" len="med"/>
-            <a:tailEnd type="none" w="med" len="med"/>
-          </a:ln>
-        </p:spPr>
-        <p:style>
-          <a:lnRef idx="1">
-            <a:schemeClr val="accent1"/>
-          </a:lnRef>
-          <a:fillRef idx="0">
-            <a:schemeClr val="accent1"/>
-          </a:fillRef>
-          <a:effectRef idx="0">
-            <a:schemeClr val="accent1"/>
-          </a:effectRef>
-          <a:fontRef idx="minor">
-            <a:schemeClr val="tx1"/>
-          </a:fontRef>
-        </p:style>
-      </p:cxnSp>
-      <p:sp>
-        <p:nvSpPr>
-          <p:cNvPr id="61" name="TextBox 60">
-            <a:extLst>
-              <a:ext uri="{FF2B5EF4-FFF2-40B4-BE49-F238E27FC236}">
-                <a16:creationId xmlns:a16="http://schemas.microsoft.com/office/drawing/2014/main" id="{84735BC9-0195-46D1-974F-D64911FE018A}"/>
-              </a:ext>
-            </a:extLst>
-          </p:cNvPr>
-          <p:cNvSpPr txBox="1"/>
-          <p:nvPr/>
-        </p:nvSpPr>
-        <p:spPr>
-          <a:xfrm>
-            <a:off x="4972150" y="3046070"/>
-            <a:ext cx="2035606" cy="184666"/>
-          </a:xfrm>
-          <a:prstGeom prst="rect">
-            <a:avLst/>
-          </a:prstGeom>
-          <a:noFill/>
-        </p:spPr>
-        <p:txBody>
-          <a:bodyPr wrap="square" lIns="0" tIns="0" rIns="0" bIns="0" rtlCol="0">
-            <a:spAutoFit/>
-          </a:bodyPr>
-          <a:lstStyle/>
-          <a:p>
-            <a:pPr algn="r"/>
-            <a:r>
-              <a:rPr lang="en-US" sz="1200" i="1" dirty="0" err="1">
-                <a:solidFill>
-                  <a:srgbClr val="6F42C1"/>
-                </a:solidFill>
-                <a:latin typeface="SFMono-Regular"/>
-              </a:rPr>
-              <a:t>boolean</a:t>
-            </a:r>
-            <a:endParaRPr lang="en-US" sz="1200" i="1" dirty="0">
-              <a:solidFill>
-                <a:srgbClr val="7030A0"/>
-              </a:solidFill>
-            </a:endParaRPr>
           </a:p>
         </p:txBody>
       </p:sp>
@@ -4726,8 +4682,8 @@
         </p:nvSpPr>
         <p:spPr>
           <a:xfrm>
-            <a:off x="7144196" y="3517377"/>
-            <a:ext cx="144013" cy="375528"/>
+            <a:off x="7130623" y="3611534"/>
+            <a:ext cx="144013" cy="274666"/>
           </a:xfrm>
           <a:prstGeom prst="rect">
             <a:avLst/>
@@ -4764,6 +4720,159 @@
             <a:endParaRPr lang="en-SG" sz="1400">
               <a:solidFill>
                 <a:schemeClr val="dk1"/>
+              </a:solidFill>
+            </a:endParaRPr>
+          </a:p>
+        </p:txBody>
+      </p:sp>
+      <p:sp>
+        <p:nvSpPr>
+          <p:cNvPr id="31" name="Rectangle 30">
+            <a:extLst>
+              <a:ext uri="{FF2B5EF4-FFF2-40B4-BE49-F238E27FC236}">
+                <a16:creationId xmlns:a16="http://schemas.microsoft.com/office/drawing/2014/main" id="{038DCA2E-EAF7-4499-8742-3B8898A881B3}"/>
+              </a:ext>
+            </a:extLst>
+          </p:cNvPr>
+          <p:cNvSpPr/>
+          <p:nvPr/>
+        </p:nvSpPr>
+        <p:spPr>
+          <a:xfrm>
+            <a:off x="7134911" y="3153543"/>
+            <a:ext cx="144016" cy="256873"/>
+          </a:xfrm>
+          <a:prstGeom prst="rect">
+            <a:avLst/>
+          </a:prstGeom>
+          <a:solidFill>
+            <a:srgbClr val="7030A0"/>
+          </a:solidFill>
+          <a:ln>
+            <a:solidFill>
+              <a:srgbClr val="7030A0"/>
+            </a:solidFill>
+          </a:ln>
+          <a:effectLst/>
+        </p:spPr>
+        <p:style>
+          <a:lnRef idx="1">
+            <a:schemeClr val="accent3"/>
+          </a:lnRef>
+          <a:fillRef idx="2">
+            <a:schemeClr val="accent3"/>
+          </a:fillRef>
+          <a:effectRef idx="1">
+            <a:schemeClr val="accent3"/>
+          </a:effectRef>
+          <a:fontRef idx="minor">
+            <a:schemeClr val="dk1"/>
+          </a:fontRef>
+        </p:style>
+        <p:txBody>
+          <a:bodyPr rtlCol="0" anchor="ctr"/>
+          <a:lstStyle/>
+          <a:p>
+            <a:pPr algn="ctr"/>
+            <a:endParaRPr lang="en-SG" sz="1400">
+              <a:solidFill>
+                <a:schemeClr val="dk1"/>
+              </a:solidFill>
+            </a:endParaRPr>
+          </a:p>
+        </p:txBody>
+      </p:sp>
+      <p:cxnSp>
+        <p:nvCxnSpPr>
+          <p:cNvPr id="32" name="Straight Arrow Connector 31">
+            <a:extLst>
+              <a:ext uri="{FF2B5EF4-FFF2-40B4-BE49-F238E27FC236}">
+                <a16:creationId xmlns:a16="http://schemas.microsoft.com/office/drawing/2014/main" id="{64D179EC-AE0F-400A-9EBD-6EFF223AC528}"/>
+              </a:ext>
+            </a:extLst>
+          </p:cNvPr>
+          <p:cNvCxnSpPr/>
+          <p:nvPr/>
+        </p:nvCxnSpPr>
+        <p:spPr>
+          <a:xfrm>
+            <a:off x="4822791" y="3157186"/>
+            <a:ext cx="2309640" cy="0"/>
+          </a:xfrm>
+          <a:prstGeom prst="straightConnector1">
+            <a:avLst/>
+          </a:prstGeom>
+          <a:ln w="19050">
+            <a:solidFill>
+              <a:srgbClr val="0070C0"/>
+            </a:solidFill>
+            <a:tailEnd type="arrow"/>
+          </a:ln>
+        </p:spPr>
+        <p:style>
+          <a:lnRef idx="1">
+            <a:schemeClr val="accent1"/>
+          </a:lnRef>
+          <a:fillRef idx="0">
+            <a:schemeClr val="accent1"/>
+          </a:fillRef>
+          <a:effectRef idx="0">
+            <a:schemeClr val="accent1"/>
+          </a:effectRef>
+          <a:fontRef idx="minor">
+            <a:schemeClr val="tx1"/>
+          </a:fontRef>
+        </p:style>
+      </p:cxnSp>
+      <p:sp>
+        <p:nvSpPr>
+          <p:cNvPr id="33" name="TextBox 32">
+            <a:extLst>
+              <a:ext uri="{FF2B5EF4-FFF2-40B4-BE49-F238E27FC236}">
+                <a16:creationId xmlns:a16="http://schemas.microsoft.com/office/drawing/2014/main" id="{6CF4FE18-EE5D-41C3-9E56-2B7748CD8CEB}"/>
+              </a:ext>
+            </a:extLst>
+          </p:cNvPr>
+          <p:cNvSpPr txBox="1"/>
+          <p:nvPr/>
+        </p:nvSpPr>
+        <p:spPr>
+          <a:xfrm>
+            <a:off x="5046624" y="2925429"/>
+            <a:ext cx="2035606" cy="184666"/>
+          </a:xfrm>
+          <a:prstGeom prst="rect">
+            <a:avLst/>
+          </a:prstGeom>
+          <a:noFill/>
+        </p:spPr>
+        <p:txBody>
+          <a:bodyPr wrap="square" lIns="0" tIns="0" rIns="0" bIns="0" rtlCol="0">
+            <a:spAutoFit/>
+          </a:bodyPr>
+          <a:lstStyle/>
+          <a:p>
+            <a:r>
+              <a:rPr lang="en-US" sz="1200" dirty="0" err="1">
+                <a:solidFill>
+                  <a:srgbClr val="6F42C1"/>
+                </a:solidFill>
+                <a:latin typeface="SFMono-Regular"/>
+              </a:rPr>
+              <a:t>readUserFile</a:t>
+            </a:r>
+            <a:r>
+              <a:rPr lang="en-US" sz="1200" dirty="0">
+                <a:solidFill>
+                  <a:srgbClr val="6F42C1"/>
+                </a:solidFill>
+                <a:latin typeface="SFMono-Regular"/>
+              </a:rPr>
+              <a:t>(…)</a:t>
+            </a:r>
+            <a:endParaRPr lang="en-US" sz="1200" dirty="0">
+              <a:solidFill>
+                <a:srgbClr val="7030A0"/>
               </a:solidFill>
             </a:endParaRPr>
           </a:p>

</xml_diff>